<commit_message>
Update intro presentation after getting remarks from Nir
</commit_message>
<xml_diff>
--- a/Intro and Main Goals.pptx
+++ b/Intro and Main Goals.pptx
@@ -203,7 +203,7 @@
           <a:p>
             <a:fld id="{99B3FE1B-01D1-459D-875F-8154E6AE5851}" type="datetimeFigureOut">
               <a:rPr lang="he-IL" smtClean="0"/>
-              <a:t>ג'/חשון/תשפ"א</a:t>
+              <a:t>ח'/חשון/תשפ"א</a:t>
             </a:fld>
             <a:endParaRPr lang="he-IL"/>
           </a:p>
@@ -623,7 +623,7 @@
           <a:p>
             <a:r>
               <a:rPr lang="he-IL" dirty="0"/>
-              <a:t>באתר נרשמות ביקורות רבות לגבי סרטים/סדרות – חלק מהביקורות חיוביות וחלק שליליות. משתמש חדש באתר יכול להזין ביקורת חדשה לסרט/תוכנית שהוא צפה בה.</a:t>
+              <a:t>באתר נרשמות ביקורות רבות לגבי סרטים/סדרות – חלק מהביקורות חיוביות וחלק שליליות. משתמש באתר יכול להזין ביקורת חדשה לסרט/תוכנית שהוא צפה בה.</a:t>
             </a:r>
           </a:p>
         </p:txBody>
@@ -710,7 +710,40 @@
           <a:p>
             <a:r>
               <a:rPr lang="he-IL" dirty="0"/>
-              <a:t>היינו רוצים לחקור את הביקורות ולהבין מה מעניין אנשים – על אילו סוגי סרטים הם כותבים (</a:t>
+              <a:t>היינו רוצים לחקור את הביקורות ונרצה לבצע </a:t>
+            </a:r>
+            <a:r>
+              <a:rPr lang="he-IL" dirty="0" err="1"/>
+              <a:t>קלאסיפיקציה</a:t>
+            </a:r>
+            <a:r>
+              <a:rPr lang="he-IL" dirty="0"/>
+              <a:t>: יש </a:t>
+            </a:r>
+            <a:r>
+              <a:rPr lang="he-IL" dirty="0" err="1"/>
+              <a:t>ברשותינו</a:t>
+            </a:r>
+            <a:r>
+              <a:rPr lang="he-IL" dirty="0"/>
+              <a:t> מאגר של 25,000 ביקורות ולכל ביקורת אנו יודעים האם היא חיובית או שלילית. נרצה לבצע מודל </a:t>
+            </a:r>
+            <a:r>
+              <a:rPr lang="he-IL" dirty="0" err="1"/>
+              <a:t>קלאסיפיקציה</a:t>
+            </a:r>
+            <a:r>
+              <a:rPr lang="he-IL" dirty="0"/>
+              <a:t> על הביקורת כדי לזהות בעתיד האם ביקורת חדשה שנכתבת היא חיובית או שלילית. מדובר באלפי ביקורות שנכתבות ולא אפשרי לקרוא כל ביקורת וביקורת. </a:t>
+            </a:r>
+          </a:p>
+          <a:p>
+            <a:endParaRPr lang="he-IL" dirty="0"/>
+          </a:p>
+          <a:p>
+            <a:r>
+              <a:rPr lang="he-IL" dirty="0"/>
+              <a:t>דרך </a:t>
             </a:r>
             <a:r>
               <a:rPr lang="en-US" dirty="0"/>
@@ -718,47 +751,20 @@
             </a:r>
             <a:r>
               <a:rPr lang="he-IL" dirty="0"/>
-              <a:t>) . נרצה לדעת מה מעניין אנשים, ובאילו תחומי עניין. </a:t>
+              <a:t> , ננסה להבין מה מעניין אנשים – על אילו סוגי סרטים הם כותבים (</a:t>
+            </a:r>
+            <a:r>
+              <a:rPr lang="en-US" dirty="0"/>
+              <a:t>topic modeling</a:t>
+            </a:r>
+            <a:r>
+              <a:rPr lang="he-IL" dirty="0"/>
+              <a:t>) . נרצה לדעת מה מעניין אנשים, ובאילו תחומי עניין. אבל חשוב לציין שאנו טרם יודעים מה אנו עתידים לקבל ולא וודאי שתוצאות המודל תהינה ברורות כל כך</a:t>
             </a:r>
             <a:br>
               <a:rPr lang="en-US" dirty="0"/>
             </a:br>
-            <a:r>
-              <a:rPr lang="he-IL" dirty="0"/>
-              <a:t>חוץ מ-</a:t>
-            </a:r>
-            <a:r>
-              <a:rPr lang="en-US" dirty="0"/>
-              <a:t>topic modeling</a:t>
-            </a:r>
-            <a:r>
-              <a:rPr lang="he-IL" dirty="0"/>
-              <a:t> נרצה לבצע גם </a:t>
-            </a:r>
-            <a:r>
-              <a:rPr lang="he-IL" dirty="0" err="1"/>
-              <a:t>קלאסיפיקציה</a:t>
-            </a:r>
-            <a:r>
-              <a:rPr lang="he-IL" dirty="0"/>
-              <a:t>: יש </a:t>
-            </a:r>
-            <a:r>
-              <a:rPr lang="he-IL" dirty="0" err="1"/>
-              <a:t>ברשותינו</a:t>
-            </a:r>
-            <a:r>
-              <a:rPr lang="he-IL" dirty="0"/>
-              <a:t> מאגר של 25,000 ביקורות ולכל ביקורת אנו יודעים האם היא חיובית או שלילית. נרצה לבצע מודל </a:t>
-            </a:r>
-            <a:r>
-              <a:rPr lang="he-IL" dirty="0" err="1"/>
-              <a:t>קלאסיפיקציה</a:t>
-            </a:r>
-            <a:r>
-              <a:rPr lang="he-IL" dirty="0"/>
-              <a:t> על הביקורת כדי לזהות בעתיד האם ביקורת חדשה שנכתבת היא חיובית או שלילית. מדובר באלפי ביקורות שנכתבות ולא אפשרי לקרוא כל ביקורת וביקורת. </a:t>
-            </a:r>
+            <a:endParaRPr lang="he-IL" dirty="0"/>
           </a:p>
           <a:p>
             <a:endParaRPr lang="he-IL" dirty="0"/>
@@ -1083,6 +1089,69 @@
             <a:endParaRPr lang="en-US" dirty="0"/>
           </a:p>
           <a:p>
+            <a:r>
+              <a:rPr lang="he-IL" dirty="0"/>
+              <a:t>עבור </a:t>
+            </a:r>
+            <a:r>
+              <a:rPr lang="en-US" dirty="0"/>
+              <a:t>cluster analysis</a:t>
+            </a:r>
+            <a:r>
+              <a:rPr lang="he-IL" dirty="0"/>
+              <a:t> נצטרך להתמודד עם </a:t>
+            </a:r>
+            <a:r>
+              <a:rPr lang="he-IL" dirty="0" err="1"/>
+              <a:t>פונקצית</a:t>
+            </a:r>
+            <a:r>
+              <a:rPr lang="he-IL" dirty="0"/>
+              <a:t> מרחק, כאן ננסה </a:t>
+            </a:r>
+            <a:r>
+              <a:rPr lang="he-IL" dirty="0" err="1"/>
+              <a:t>להעזר</a:t>
+            </a:r>
+            <a:r>
+              <a:rPr lang="he-IL" dirty="0"/>
+              <a:t> בייצוג של </a:t>
+            </a:r>
+            <a:r>
+              <a:rPr lang="en-US" dirty="0"/>
+              <a:t>Word2Vec</a:t>
+            </a:r>
+            <a:r>
+              <a:rPr lang="he-IL" dirty="0"/>
+              <a:t> או </a:t>
+            </a:r>
+            <a:r>
+              <a:rPr lang="en-US" dirty="0"/>
+              <a:t>Doc2Vec</a:t>
+            </a:r>
+            <a:r>
+              <a:rPr lang="he-IL" dirty="0"/>
+              <a:t> כדי לציין </a:t>
+            </a:r>
+            <a:r>
+              <a:rPr lang="en-US" dirty="0"/>
+              <a:t>similarity</a:t>
+            </a:r>
+            <a:r>
+              <a:rPr lang="he-IL" dirty="0"/>
+              <a:t> בין </a:t>
+            </a:r>
+            <a:r>
+              <a:rPr lang="en-US" dirty="0"/>
+              <a:t>reviews</a:t>
+            </a:r>
+            <a:r>
+              <a:rPr lang="he-IL"/>
+              <a:t> דומים.</a:t>
+            </a:r>
+            <a:endParaRPr lang="he-IL" dirty="0"/>
+          </a:p>
+          <a:p>
             <a:endParaRPr lang="he-IL" dirty="0"/>
           </a:p>
           <a:p>
@@ -1093,6 +1162,14 @@
             <a:r>
               <a:rPr lang="en-US" dirty="0"/>
               <a:t>recall + precision</a:t>
+            </a:r>
+            <a:r>
+              <a:rPr lang="he-IL" dirty="0"/>
+              <a:t> + </a:t>
+            </a:r>
+            <a:r>
+              <a:rPr lang="en-US" dirty="0"/>
+              <a:t>F-Score</a:t>
             </a:r>
             <a:endParaRPr lang="he-IL" dirty="0"/>
           </a:p>
@@ -1553,7 +1630,7 @@
           <a:p>
             <a:fld id="{8236B938-022E-4225-A7C0-0A189B935F48}" type="datetimeFigureOut">
               <a:rPr lang="he-IL" smtClean="0"/>
-              <a:t>ג'/חשון/תשפ"א</a:t>
+              <a:t>ח'/חשון/תשפ"א</a:t>
             </a:fld>
             <a:endParaRPr lang="he-IL"/>
           </a:p>
@@ -2641,7 +2718,7 @@
           <a:p>
             <a:fld id="{8236B938-022E-4225-A7C0-0A189B935F48}" type="datetimeFigureOut">
               <a:rPr lang="he-IL" smtClean="0"/>
-              <a:t>ג'/חשון/תשפ"א</a:t>
+              <a:t>ח'/חשון/תשפ"א</a:t>
             </a:fld>
             <a:endParaRPr lang="he-IL"/>
           </a:p>
@@ -3621,7 +3698,7 @@
           <a:p>
             <a:fld id="{8236B938-022E-4225-A7C0-0A189B935F48}" type="datetimeFigureOut">
               <a:rPr lang="he-IL" smtClean="0"/>
-              <a:t>ג'/חשון/תשפ"א</a:t>
+              <a:t>ח'/חשון/תשפ"א</a:t>
             </a:fld>
             <a:endParaRPr lang="he-IL"/>
           </a:p>
@@ -4755,7 +4832,7 @@
           <a:p>
             <a:fld id="{8236B938-022E-4225-A7C0-0A189B935F48}" type="datetimeFigureOut">
               <a:rPr lang="he-IL" smtClean="0"/>
-              <a:t>ג'/חשון/תשפ"א</a:t>
+              <a:t>ח'/חשון/תשפ"א</a:t>
             </a:fld>
             <a:endParaRPr lang="he-IL"/>
           </a:p>
@@ -5788,7 +5865,7 @@
           <a:p>
             <a:fld id="{8236B938-022E-4225-A7C0-0A189B935F48}" type="datetimeFigureOut">
               <a:rPr lang="he-IL" smtClean="0"/>
-              <a:t>ג'/חשון/תשפ"א</a:t>
+              <a:t>ח'/חשון/תשפ"א</a:t>
             </a:fld>
             <a:endParaRPr lang="he-IL"/>
           </a:p>
@@ -6448,7 +6525,7 @@
           <a:p>
             <a:fld id="{8236B938-022E-4225-A7C0-0A189B935F48}" type="datetimeFigureOut">
               <a:rPr lang="he-IL" smtClean="0"/>
-              <a:t>ג'/חשון/תשפ"א</a:t>
+              <a:t>ח'/חשון/תשפ"א</a:t>
             </a:fld>
             <a:endParaRPr lang="he-IL"/>
           </a:p>
@@ -7309,7 +7386,7 @@
           <a:p>
             <a:fld id="{8236B938-022E-4225-A7C0-0A189B935F48}" type="datetimeFigureOut">
               <a:rPr lang="he-IL" smtClean="0"/>
-              <a:t>ג'/חשון/תשפ"א</a:t>
+              <a:t>ח'/חשון/תשפ"א</a:t>
             </a:fld>
             <a:endParaRPr lang="he-IL"/>
           </a:p>
@@ -7499,7 +7576,7 @@
           <a:p>
             <a:fld id="{8236B938-022E-4225-A7C0-0A189B935F48}" type="datetimeFigureOut">
               <a:rPr lang="he-IL" smtClean="0"/>
-              <a:t>ג'/חשון/תשפ"א</a:t>
+              <a:t>ח'/חשון/תשפ"א</a:t>
             </a:fld>
             <a:endParaRPr lang="he-IL"/>
           </a:p>
@@ -8471,7 +8548,7 @@
           <a:p>
             <a:fld id="{8236B938-022E-4225-A7C0-0A189B935F48}" type="datetimeFigureOut">
               <a:rPr lang="he-IL" smtClean="0"/>
-              <a:t>ג'/חשון/תשפ"א</a:t>
+              <a:t>ח'/חשון/תשפ"א</a:t>
             </a:fld>
             <a:endParaRPr lang="he-IL"/>
           </a:p>
@@ -8682,7 +8759,7 @@
           <a:p>
             <a:fld id="{8236B938-022E-4225-A7C0-0A189B935F48}" type="datetimeFigureOut">
               <a:rPr lang="he-IL" smtClean="0"/>
-              <a:t>ג'/חשון/תשפ"א</a:t>
+              <a:t>ח'/חשון/תשפ"א</a:t>
             </a:fld>
             <a:endParaRPr lang="he-IL"/>
           </a:p>
@@ -9716,7 +9793,7 @@
           <a:p>
             <a:fld id="{8236B938-022E-4225-A7C0-0A189B935F48}" type="datetimeFigureOut">
               <a:rPr lang="he-IL" smtClean="0"/>
-              <a:t>ג'/חשון/תשפ"א</a:t>
+              <a:t>ח'/חשון/תשפ"א</a:t>
             </a:fld>
             <a:endParaRPr lang="he-IL"/>
           </a:p>
@@ -9988,7 +10065,7 @@
           <a:p>
             <a:fld id="{8236B938-022E-4225-A7C0-0A189B935F48}" type="datetimeFigureOut">
               <a:rPr lang="he-IL" smtClean="0"/>
-              <a:t>ג'/חשון/תשפ"א</a:t>
+              <a:t>ח'/חשון/תשפ"א</a:t>
             </a:fld>
             <a:endParaRPr lang="he-IL"/>
           </a:p>
@@ -10403,7 +10480,7 @@
           <a:p>
             <a:fld id="{8236B938-022E-4225-A7C0-0A189B935F48}" type="datetimeFigureOut">
               <a:rPr lang="he-IL" smtClean="0"/>
-              <a:t>ג'/חשון/תשפ"א</a:t>
+              <a:t>ח'/חשון/תשפ"א</a:t>
             </a:fld>
             <a:endParaRPr lang="he-IL"/>
           </a:p>
@@ -10535,7 +10612,7 @@
           <a:p>
             <a:fld id="{8236B938-022E-4225-A7C0-0A189B935F48}" type="datetimeFigureOut">
               <a:rPr lang="he-IL" smtClean="0"/>
-              <a:t>ג'/חשון/תשפ"א</a:t>
+              <a:t>ח'/חשון/תשפ"א</a:t>
             </a:fld>
             <a:endParaRPr lang="he-IL"/>
           </a:p>
@@ -10630,7 +10707,7 @@
           <a:p>
             <a:fld id="{8236B938-022E-4225-A7C0-0A189B935F48}" type="datetimeFigureOut">
               <a:rPr lang="he-IL" smtClean="0"/>
-              <a:t>ג'/חשון/תשפ"א</a:t>
+              <a:t>ח'/חשון/תשפ"א</a:t>
             </a:fld>
             <a:endParaRPr lang="he-IL"/>
           </a:p>
@@ -11711,7 +11788,7 @@
           <a:p>
             <a:fld id="{8236B938-022E-4225-A7C0-0A189B935F48}" type="datetimeFigureOut">
               <a:rPr lang="he-IL" smtClean="0"/>
-              <a:t>ג'/חשון/תשפ"א</a:t>
+              <a:t>ח'/חשון/תשפ"א</a:t>
             </a:fld>
             <a:endParaRPr lang="he-IL"/>
           </a:p>
@@ -12824,7 +12901,7 @@
           <a:p>
             <a:fld id="{8236B938-022E-4225-A7C0-0A189B935F48}" type="datetimeFigureOut">
               <a:rPr lang="he-IL" smtClean="0"/>
-              <a:t>ג'/חשון/תשפ"א</a:t>
+              <a:t>ח'/חשון/תשפ"א</a:t>
             </a:fld>
             <a:endParaRPr lang="he-IL"/>
           </a:p>
@@ -13821,7 +13898,7 @@
           <a:p>
             <a:fld id="{8236B938-022E-4225-A7C0-0A189B935F48}" type="datetimeFigureOut">
               <a:rPr lang="he-IL" smtClean="0"/>
-              <a:t>ג'/חשון/תשפ"א</a:t>
+              <a:t>ח'/חשון/תשפ"א</a:t>
             </a:fld>
             <a:endParaRPr lang="he-IL"/>
           </a:p>
@@ -15905,7 +15982,7 @@
         </p:nvSpPr>
         <p:spPr>
           <a:xfrm>
-            <a:off x="6982754" y="3299643"/>
+            <a:off x="6866448" y="5318336"/>
             <a:ext cx="5060856" cy="707886"/>
           </a:xfrm>
           <a:prstGeom prst="rect">
@@ -15955,7 +16032,7 @@
         </p:nvSpPr>
         <p:spPr>
           <a:xfrm>
-            <a:off x="6982754" y="4485517"/>
+            <a:off x="6866448" y="3433870"/>
             <a:ext cx="5060856" cy="1323439"/>
           </a:xfrm>
           <a:prstGeom prst="rect">

</xml_diff>